<commit_message>
adding program for duplicate element in the array
</commit_message>
<xml_diff>
--- a/NodeJs.pptx
+++ b/NodeJs.pptx
@@ -3522,7 +3522,7 @@
           <a:p>
             <a:r>
               <a:rPr lang="en-IN" altLang="en-US"/>
-              <a:t>post for inseting information</a:t>
+              <a:t>post for inserting information</a:t>
             </a:r>
             <a:endParaRPr lang="en-IN" altLang="en-US"/>
           </a:p>
@@ -3607,6 +3607,30 @@
               <a:rPr lang="en-IN" altLang="en-US"/>
               <a:t>Mysql database can be used in node.js using express with mysql/sequelize</a:t>
             </a:r>
+            <a:endParaRPr lang="en-IN" altLang="en-US"/>
+          </a:p>
+          <a:p>
+            <a:r>
+              <a:rPr lang="en-IN" altLang="en-US"/>
+              <a:t>Can be used to perform multiple statements execution also</a:t>
+            </a:r>
+            <a:endParaRPr lang="en-IN" altLang="en-US"/>
+          </a:p>
+          <a:p>
+            <a:r>
+              <a:rPr lang="en-IN" altLang="en-US"/>
+              <a:t>has to be mentioned oncein the code in order to connnect it to main database</a:t>
+            </a:r>
+            <a:endParaRPr lang="en-IN" altLang="en-US"/>
+          </a:p>
+          <a:p>
+            <a:r>
+              <a:rPr lang="en-IN" altLang="en-US"/>
+              <a:t>express can be used to connect with sql kind of database with libraries.</a:t>
+            </a:r>
+            <a:endParaRPr lang="en-IN" altLang="en-US"/>
+          </a:p>
+          <a:p>
             <a:endParaRPr lang="en-IN" altLang="en-US"/>
           </a:p>
           <a:p>

</xml_diff>